<commit_message>
chg: Added border to use case image
</commit_message>
<xml_diff>
--- a/img/images.pptx
+++ b/img/images.pptx
@@ -3373,7 +3373,7 @@
         </p:nvSpPr>
         <p:spPr>
           <a:xfrm>
-            <a:off x="2547288" y="3659840"/>
+            <a:off x="3240624" y="3659840"/>
             <a:ext cx="240631" cy="286043"/>
           </a:xfrm>
           <a:prstGeom prst="downArrow">
@@ -3430,7 +3430,7 @@
         </p:nvSpPr>
         <p:spPr>
           <a:xfrm>
-            <a:off x="1101964" y="3562939"/>
+            <a:off x="1795300" y="3562939"/>
             <a:ext cx="3127697" cy="240632"/>
           </a:xfrm>
           <a:prstGeom prst="roundRect">
@@ -3486,7 +3486,7 @@
         </p:nvSpPr>
         <p:spPr>
           <a:xfrm>
-            <a:off x="3523931" y="2231048"/>
+            <a:off x="4217267" y="2231048"/>
             <a:ext cx="240631" cy="1405109"/>
           </a:xfrm>
           <a:prstGeom prst="downArrow">
@@ -3548,7 +3548,7 @@
         </p:blipFill>
         <p:spPr>
           <a:xfrm>
-            <a:off x="3041573" y="2307976"/>
+            <a:off x="3734909" y="2307976"/>
             <a:ext cx="1205346" cy="1046018"/>
           </a:xfrm>
           <a:prstGeom prst="rect">
@@ -3570,7 +3570,7 @@
         </p:nvSpPr>
         <p:spPr>
           <a:xfrm>
-            <a:off x="3066730" y="2015800"/>
+            <a:off x="3760066" y="2015800"/>
             <a:ext cx="1155032" cy="240632"/>
           </a:xfrm>
           <a:prstGeom prst="roundRect">
@@ -3624,7 +3624,7 @@
         </p:nvSpPr>
         <p:spPr>
           <a:xfrm>
-            <a:off x="3025801" y="2005311"/>
+            <a:off x="3719137" y="2005311"/>
             <a:ext cx="1236891" cy="246221"/>
           </a:xfrm>
           <a:prstGeom prst="rect">
@@ -3664,7 +3664,7 @@
         </p:nvGrpSpPr>
         <p:grpSpPr>
           <a:xfrm>
-            <a:off x="3885142" y="2039349"/>
+            <a:off x="4578478" y="2039349"/>
             <a:ext cx="316674" cy="176064"/>
             <a:chOff x="5195380" y="1843116"/>
             <a:chExt cx="322613" cy="213208"/>
@@ -3795,7 +3795,7 @@
         </p:blipFill>
         <p:spPr>
           <a:xfrm>
-            <a:off x="3499295" y="3354895"/>
+            <a:off x="4192631" y="3354895"/>
             <a:ext cx="289902" cy="116162"/>
           </a:xfrm>
           <a:prstGeom prst="rect">
@@ -3828,7 +3828,7 @@
         </p:blipFill>
         <p:spPr>
           <a:xfrm>
-            <a:off x="2265111" y="3574093"/>
+            <a:off x="2958447" y="3574093"/>
             <a:ext cx="771824" cy="252478"/>
           </a:xfrm>
           <a:prstGeom prst="rect">
@@ -3850,7 +3850,7 @@
         </p:nvSpPr>
         <p:spPr>
           <a:xfrm>
-            <a:off x="1568258" y="2231048"/>
+            <a:off x="2261594" y="2231048"/>
             <a:ext cx="240631" cy="1405109"/>
           </a:xfrm>
           <a:prstGeom prst="downArrow">
@@ -3912,7 +3912,7 @@
         </p:blipFill>
         <p:spPr>
           <a:xfrm>
-            <a:off x="1085900" y="2307976"/>
+            <a:off x="1779236" y="2307976"/>
             <a:ext cx="1205346" cy="1046018"/>
           </a:xfrm>
           <a:prstGeom prst="rect">
@@ -3934,7 +3934,7 @@
         </p:nvSpPr>
         <p:spPr>
           <a:xfrm>
-            <a:off x="1111057" y="2015800"/>
+            <a:off x="1804393" y="2015800"/>
             <a:ext cx="1155032" cy="240632"/>
           </a:xfrm>
           <a:prstGeom prst="roundRect">
@@ -3988,7 +3988,7 @@
         </p:nvSpPr>
         <p:spPr>
           <a:xfrm>
-            <a:off x="1070128" y="2005311"/>
+            <a:off x="1763464" y="2005311"/>
             <a:ext cx="1236891" cy="246221"/>
           </a:xfrm>
           <a:prstGeom prst="rect">
@@ -4028,7 +4028,7 @@
         </p:nvGrpSpPr>
         <p:grpSpPr>
           <a:xfrm>
-            <a:off x="1929469" y="2039351"/>
+            <a:off x="2622805" y="2039351"/>
             <a:ext cx="316674" cy="200055"/>
             <a:chOff x="5195380" y="1843116"/>
             <a:chExt cx="322613" cy="242260"/>
@@ -4159,7 +4159,7 @@
         </p:blipFill>
         <p:spPr>
           <a:xfrm>
-            <a:off x="1543622" y="3354895"/>
+            <a:off x="2236958" y="3354895"/>
             <a:ext cx="289902" cy="116162"/>
           </a:xfrm>
           <a:prstGeom prst="rect">
@@ -4184,7 +4184,7 @@
         </p:nvSpPr>
         <p:spPr>
           <a:xfrm>
-            <a:off x="2425148" y="3950340"/>
+            <a:off x="3118484" y="3950340"/>
             <a:ext cx="476098" cy="240632"/>
           </a:xfrm>
           <a:prstGeom prst="roundRect">
@@ -4238,7 +4238,7 @@
         </p:nvSpPr>
         <p:spPr>
           <a:xfrm>
-            <a:off x="2578001" y="3949376"/>
+            <a:off x="3271337" y="3949376"/>
             <a:ext cx="386400" cy="246221"/>
           </a:xfrm>
           <a:prstGeom prst="rect">
@@ -4286,7 +4286,7 @@
         </p:blipFill>
         <p:spPr>
           <a:xfrm>
-            <a:off x="2491809" y="4011255"/>
+            <a:off x="3185145" y="4011255"/>
             <a:ext cx="137092" cy="120547"/>
           </a:xfrm>
           <a:prstGeom prst="rect">
@@ -4308,7 +4308,7 @@
         </p:nvSpPr>
         <p:spPr>
           <a:xfrm>
-            <a:off x="2132340" y="4179499"/>
+            <a:off x="2825676" y="4179499"/>
             <a:ext cx="1079548" cy="169277"/>
           </a:xfrm>
           <a:prstGeom prst="rect">
@@ -4335,6 +4335,96 @@
               </a:rPr>
               <a:t>DEPLOYMENT RISK</a:t>
             </a:r>
+          </a:p>
+        </p:txBody>
+      </p:sp>
+      <p:sp>
+        <p:nvSpPr>
+          <p:cNvPr id="2" name="Rectangle 1">
+            <a:extLst>
+              <a:ext uri="{FF2B5EF4-FFF2-40B4-BE49-F238E27FC236}">
+                <a16:creationId xmlns:a16="http://schemas.microsoft.com/office/drawing/2014/main" id="{22C5A6B1-BBEC-D344-92A9-B19C6B11A6FE}"/>
+              </a:ext>
+            </a:extLst>
+          </p:cNvPr>
+          <p:cNvSpPr/>
+          <p:nvPr/>
+        </p:nvSpPr>
+        <p:spPr>
+          <a:xfrm>
+            <a:off x="783770" y="1436914"/>
+            <a:ext cx="5526593" cy="3305908"/>
+          </a:xfrm>
+          <a:prstGeom prst="rect">
+            <a:avLst/>
+          </a:prstGeom>
+          <a:noFill/>
+          <a:ln>
+            <a:noFill/>
+          </a:ln>
+        </p:spPr>
+        <p:style>
+          <a:lnRef idx="2">
+            <a:schemeClr val="accent1">
+              <a:shade val="50000"/>
+            </a:schemeClr>
+          </a:lnRef>
+          <a:fillRef idx="1">
+            <a:schemeClr val="accent1"/>
+          </a:fillRef>
+          <a:effectRef idx="0">
+            <a:schemeClr val="accent1"/>
+          </a:effectRef>
+          <a:fontRef idx="minor">
+            <a:schemeClr val="lt1"/>
+          </a:fontRef>
+        </p:style>
+        <p:txBody>
+          <a:bodyPr rtlCol="0" anchor="ctr"/>
+          <a:lstStyle/>
+          <a:p>
+            <a:pPr algn="ctr"/>
+            <a:endParaRPr lang="en-US"/>
+          </a:p>
+        </p:txBody>
+      </p:sp>
+      <p:sp>
+        <p:nvSpPr>
+          <p:cNvPr id="3" name="TextBox 2">
+            <a:extLst>
+              <a:ext uri="{FF2B5EF4-FFF2-40B4-BE49-F238E27FC236}">
+                <a16:creationId xmlns:a16="http://schemas.microsoft.com/office/drawing/2014/main" id="{078CF885-5FBF-BD4A-84B4-496E10A90918}"/>
+              </a:ext>
+            </a:extLst>
+          </p:cNvPr>
+          <p:cNvSpPr txBox="1"/>
+          <p:nvPr/>
+        </p:nvSpPr>
+        <p:spPr>
+          <a:xfrm>
+            <a:off x="231112" y="170821"/>
+            <a:ext cx="4803559" cy="369332"/>
+          </a:xfrm>
+          <a:prstGeom prst="rect">
+            <a:avLst/>
+          </a:prstGeom>
+          <a:noFill/>
+        </p:spPr>
+        <p:txBody>
+          <a:bodyPr wrap="none" rtlCol="0">
+            <a:spAutoFit/>
+          </a:bodyPr>
+          <a:lstStyle/>
+          <a:p>
+            <a:r>
+              <a:rPr lang="en-US" dirty="0"/>
+              <a:t>You must copy all the elements of the slide</a:t>
+            </a:r>
+            <a:r>
+              <a:rPr lang="en-US"/>
+              <a:t>: ctrl-a</a:t>
+            </a:r>
+            <a:endParaRPr lang="en-US" dirty="0"/>
           </a:p>
         </p:txBody>
       </p:sp>

</xml_diff>

<commit_message>
chg: added set_host functionality to set host api of logsight SDK
</commit_message>
<xml_diff>
--- a/img/images.pptx
+++ b/img/images.pptx
@@ -4352,8 +4352,8 @@
         </p:nvSpPr>
         <p:spPr>
           <a:xfrm>
-            <a:off x="783770" y="1436914"/>
-            <a:ext cx="5526593" cy="3305908"/>
+            <a:off x="1055078" y="1748413"/>
+            <a:ext cx="4652386" cy="2773346"/>
           </a:xfrm>
           <a:prstGeom prst="rect">
             <a:avLst/>

</xml_diff>